<commit_message>
Criação das aulas 7, 8, 9 e 10.
</commit_message>
<xml_diff>
--- a/NetCore/00 Docs/Treinamento Pró Lógos.pptx
+++ b/NetCore/00 Docs/Treinamento Pró Lógos.pptx
@@ -16,6 +16,12 @@
     <p:sldId id="263" r:id="rId10"/>
     <p:sldId id="264" r:id="rId11"/>
     <p:sldId id="266" r:id="rId12"/>
+    <p:sldId id="267" r:id="rId13"/>
+    <p:sldId id="268" r:id="rId14"/>
+    <p:sldId id="269" r:id="rId15"/>
+    <p:sldId id="270" r:id="rId16"/>
+    <p:sldId id="271" r:id="rId17"/>
+    <p:sldId id="272" r:id="rId18"/>
   </p:sldIdLst>
   <p:sldSz cx="12192000" cy="6858000"/>
   <p:notesSz cx="6858000" cy="9144000"/>
@@ -269,7 +275,7 @@
           <a:p>
             <a:fld id="{D31240F6-27C2-40B6-BB87-F41720AAABD7}" type="datetimeFigureOut">
               <a:rPr lang="pt-BR" smtClean="0"/>
-              <a:t>14/11/2018</a:t>
+              <a:t>18/12/2018</a:t>
             </a:fld>
             <a:endParaRPr lang="pt-BR"/>
           </a:p>
@@ -467,7 +473,7 @@
           <a:p>
             <a:fld id="{D31240F6-27C2-40B6-BB87-F41720AAABD7}" type="datetimeFigureOut">
               <a:rPr lang="pt-BR" smtClean="0"/>
-              <a:t>14/11/2018</a:t>
+              <a:t>18/12/2018</a:t>
             </a:fld>
             <a:endParaRPr lang="pt-BR"/>
           </a:p>
@@ -675,7 +681,7 @@
           <a:p>
             <a:fld id="{D31240F6-27C2-40B6-BB87-F41720AAABD7}" type="datetimeFigureOut">
               <a:rPr lang="pt-BR" smtClean="0"/>
-              <a:t>14/11/2018</a:t>
+              <a:t>18/12/2018</a:t>
             </a:fld>
             <a:endParaRPr lang="pt-BR"/>
           </a:p>
@@ -873,7 +879,7 @@
           <a:p>
             <a:fld id="{D31240F6-27C2-40B6-BB87-F41720AAABD7}" type="datetimeFigureOut">
               <a:rPr lang="pt-BR" smtClean="0"/>
-              <a:t>14/11/2018</a:t>
+              <a:t>18/12/2018</a:t>
             </a:fld>
             <a:endParaRPr lang="pt-BR"/>
           </a:p>
@@ -1148,7 +1154,7 @@
           <a:p>
             <a:fld id="{D31240F6-27C2-40B6-BB87-F41720AAABD7}" type="datetimeFigureOut">
               <a:rPr lang="pt-BR" smtClean="0"/>
-              <a:t>14/11/2018</a:t>
+              <a:t>18/12/2018</a:t>
             </a:fld>
             <a:endParaRPr lang="pt-BR"/>
           </a:p>
@@ -1413,7 +1419,7 @@
           <a:p>
             <a:fld id="{D31240F6-27C2-40B6-BB87-F41720AAABD7}" type="datetimeFigureOut">
               <a:rPr lang="pt-BR" smtClean="0"/>
-              <a:t>14/11/2018</a:t>
+              <a:t>18/12/2018</a:t>
             </a:fld>
             <a:endParaRPr lang="pt-BR"/>
           </a:p>
@@ -1825,7 +1831,7 @@
           <a:p>
             <a:fld id="{D31240F6-27C2-40B6-BB87-F41720AAABD7}" type="datetimeFigureOut">
               <a:rPr lang="pt-BR" smtClean="0"/>
-              <a:t>14/11/2018</a:t>
+              <a:t>18/12/2018</a:t>
             </a:fld>
             <a:endParaRPr lang="pt-BR"/>
           </a:p>
@@ -1966,7 +1972,7 @@
           <a:p>
             <a:fld id="{D31240F6-27C2-40B6-BB87-F41720AAABD7}" type="datetimeFigureOut">
               <a:rPr lang="pt-BR" smtClean="0"/>
-              <a:t>14/11/2018</a:t>
+              <a:t>18/12/2018</a:t>
             </a:fld>
             <a:endParaRPr lang="pt-BR"/>
           </a:p>
@@ -2079,7 +2085,7 @@
           <a:p>
             <a:fld id="{D31240F6-27C2-40B6-BB87-F41720AAABD7}" type="datetimeFigureOut">
               <a:rPr lang="pt-BR" smtClean="0"/>
-              <a:t>14/11/2018</a:t>
+              <a:t>18/12/2018</a:t>
             </a:fld>
             <a:endParaRPr lang="pt-BR"/>
           </a:p>
@@ -2390,7 +2396,7 @@
           <a:p>
             <a:fld id="{D31240F6-27C2-40B6-BB87-F41720AAABD7}" type="datetimeFigureOut">
               <a:rPr lang="pt-BR" smtClean="0"/>
-              <a:t>14/11/2018</a:t>
+              <a:t>18/12/2018</a:t>
             </a:fld>
             <a:endParaRPr lang="pt-BR"/>
           </a:p>
@@ -2678,7 +2684,7 @@
           <a:p>
             <a:fld id="{D31240F6-27C2-40B6-BB87-F41720AAABD7}" type="datetimeFigureOut">
               <a:rPr lang="pt-BR" smtClean="0"/>
-              <a:t>14/11/2018</a:t>
+              <a:t>18/12/2018</a:t>
             </a:fld>
             <a:endParaRPr lang="pt-BR"/>
           </a:p>
@@ -2943,7 +2949,7 @@
           <a:p>
             <a:fld id="{D31240F6-27C2-40B6-BB87-F41720AAABD7}" type="datetimeFigureOut">
               <a:rPr lang="pt-BR" smtClean="0"/>
-              <a:t>14/11/2018</a:t>
+              <a:t>18/12/2018</a:t>
             </a:fld>
             <a:endParaRPr lang="pt-BR"/>
           </a:p>
@@ -5615,6 +5621,1248 @@
 </p:sld>
 </file>
 
+<file path=ppt/slides/slide12.xml><?xml version="1.0" encoding="utf-8"?>
+<p:sld xmlns:a="http://schemas.openxmlformats.org/drawingml/2006/main" xmlns:r="http://schemas.openxmlformats.org/officeDocument/2006/relationships" xmlns:p="http://schemas.openxmlformats.org/presentationml/2006/main">
+  <p:cSld>
+    <p:spTree>
+      <p:nvGrpSpPr>
+        <p:cNvPr id="1" name=""/>
+        <p:cNvGrpSpPr/>
+        <p:nvPr/>
+      </p:nvGrpSpPr>
+      <p:grpSpPr>
+        <a:xfrm>
+          <a:off x="0" y="0"/>
+          <a:ext cx="0" cy="0"/>
+          <a:chOff x="0" y="0"/>
+          <a:chExt cx="0" cy="0"/>
+        </a:xfrm>
+      </p:grpSpPr>
+      <p:sp>
+        <p:nvSpPr>
+          <p:cNvPr id="2" name="CaixaDeTexto 1">
+            <a:extLst>
+              <a:ext uri="{FF2B5EF4-FFF2-40B4-BE49-F238E27FC236}">
+                <a16:creationId xmlns:a16="http://schemas.microsoft.com/office/drawing/2014/main" id="{F9F1AD6C-A1DC-4741-A4D0-50807A1C21F0}"/>
+              </a:ext>
+            </a:extLst>
+          </p:cNvPr>
+          <p:cNvSpPr txBox="1"/>
+          <p:nvPr/>
+        </p:nvSpPr>
+        <p:spPr>
+          <a:xfrm>
+            <a:off x="365765" y="126259"/>
+            <a:ext cx="2502736" cy="461665"/>
+          </a:xfrm>
+          <a:prstGeom prst="rect">
+            <a:avLst/>
+          </a:prstGeom>
+          <a:noFill/>
+        </p:spPr>
+        <p:txBody>
+          <a:bodyPr wrap="none" rtlCol="0">
+            <a:spAutoFit/>
+          </a:bodyPr>
+          <a:lstStyle/>
+          <a:p>
+            <a:r>
+              <a:rPr lang="pt-BR" sz="2400" b="1" dirty="0"/>
+              <a:t>7. Banco de dados</a:t>
+            </a:r>
+          </a:p>
+        </p:txBody>
+      </p:sp>
+      <p:pic>
+        <p:nvPicPr>
+          <p:cNvPr id="3" name="Imagem 2">
+            <a:extLst>
+              <a:ext uri="{FF2B5EF4-FFF2-40B4-BE49-F238E27FC236}">
+                <a16:creationId xmlns:a16="http://schemas.microsoft.com/office/drawing/2014/main" id="{41F4D5F1-91E7-4F0F-9E28-AA4654FB40B9}"/>
+              </a:ext>
+            </a:extLst>
+          </p:cNvPr>
+          <p:cNvPicPr>
+            <a:picLocks noChangeAspect="1"/>
+          </p:cNvPicPr>
+          <p:nvPr/>
+        </p:nvPicPr>
+        <p:blipFill>
+          <a:blip r:embed="rId2"/>
+          <a:stretch>
+            <a:fillRect/>
+          </a:stretch>
+        </p:blipFill>
+        <p:spPr>
+          <a:xfrm>
+            <a:off x="1770616" y="1052510"/>
+            <a:ext cx="3419475" cy="4752975"/>
+          </a:xfrm>
+          <a:prstGeom prst="rect">
+            <a:avLst/>
+          </a:prstGeom>
+        </p:spPr>
+      </p:pic>
+      <p:sp>
+        <p:nvSpPr>
+          <p:cNvPr id="4" name="CaixaDeTexto 3">
+            <a:extLst>
+              <a:ext uri="{FF2B5EF4-FFF2-40B4-BE49-F238E27FC236}">
+                <a16:creationId xmlns:a16="http://schemas.microsoft.com/office/drawing/2014/main" id="{236A46D7-CC0B-46C1-BD07-5DA0292FBB41}"/>
+              </a:ext>
+            </a:extLst>
+          </p:cNvPr>
+          <p:cNvSpPr txBox="1"/>
+          <p:nvPr/>
+        </p:nvSpPr>
+        <p:spPr>
+          <a:xfrm>
+            <a:off x="6096000" y="2828834"/>
+            <a:ext cx="4949184" cy="1200329"/>
+          </a:xfrm>
+          <a:prstGeom prst="rect">
+            <a:avLst/>
+          </a:prstGeom>
+          <a:noFill/>
+        </p:spPr>
+        <p:txBody>
+          <a:bodyPr wrap="square" rtlCol="0">
+            <a:spAutoFit/>
+          </a:bodyPr>
+          <a:lstStyle/>
+          <a:p>
+            <a:r>
+              <a:rPr lang="pt-BR" dirty="0"/>
+              <a:t>Nós iremos trabalhar com o banco de dados atual da Pró </a:t>
+            </a:r>
+            <a:r>
+              <a:rPr lang="pt-BR" dirty="0" err="1"/>
+              <a:t>Lógos</a:t>
+            </a:r>
+            <a:r>
+              <a:rPr lang="pt-BR" dirty="0"/>
+              <a:t> em produção, entretanto, para este treinamento devemos criar o seguinte banco de dados e tabelas.</a:t>
+            </a:r>
+          </a:p>
+        </p:txBody>
+      </p:sp>
+    </p:spTree>
+    <p:extLst>
+      <p:ext uri="{BB962C8B-B14F-4D97-AF65-F5344CB8AC3E}">
+        <p14:creationId xmlns:p14="http://schemas.microsoft.com/office/powerpoint/2010/main" val="3516660056"/>
+      </p:ext>
+    </p:extLst>
+  </p:cSld>
+  <p:clrMapOvr>
+    <a:masterClrMapping/>
+  </p:clrMapOvr>
+</p:sld>
+</file>
+
+<file path=ppt/slides/slide13.xml><?xml version="1.0" encoding="utf-8"?>
+<p:sld xmlns:a="http://schemas.openxmlformats.org/drawingml/2006/main" xmlns:r="http://schemas.openxmlformats.org/officeDocument/2006/relationships" xmlns:p="http://schemas.openxmlformats.org/presentationml/2006/main">
+  <p:cSld>
+    <p:spTree>
+      <p:nvGrpSpPr>
+        <p:cNvPr id="1" name=""/>
+        <p:cNvGrpSpPr/>
+        <p:nvPr/>
+      </p:nvGrpSpPr>
+      <p:grpSpPr>
+        <a:xfrm>
+          <a:off x="0" y="0"/>
+          <a:ext cx="0" cy="0"/>
+          <a:chOff x="0" y="0"/>
+          <a:chExt cx="0" cy="0"/>
+        </a:xfrm>
+      </p:grpSpPr>
+      <p:sp>
+        <p:nvSpPr>
+          <p:cNvPr id="2" name="CaixaDeTexto 1">
+            <a:extLst>
+              <a:ext uri="{FF2B5EF4-FFF2-40B4-BE49-F238E27FC236}">
+                <a16:creationId xmlns:a16="http://schemas.microsoft.com/office/drawing/2014/main" id="{97B1C328-04E8-46DD-A223-F69604DA3F13}"/>
+              </a:ext>
+            </a:extLst>
+          </p:cNvPr>
+          <p:cNvSpPr txBox="1"/>
+          <p:nvPr/>
+        </p:nvSpPr>
+        <p:spPr>
+          <a:xfrm>
+            <a:off x="365765" y="126259"/>
+            <a:ext cx="8800101" cy="461665"/>
+          </a:xfrm>
+          <a:prstGeom prst="rect">
+            <a:avLst/>
+          </a:prstGeom>
+          <a:noFill/>
+        </p:spPr>
+        <p:txBody>
+          <a:bodyPr wrap="none" rtlCol="0">
+            <a:spAutoFit/>
+          </a:bodyPr>
+          <a:lstStyle/>
+          <a:p>
+            <a:r>
+              <a:rPr lang="pt-BR" sz="2400" b="1" dirty="0"/>
+              <a:t>8. Criação da conexão e dos métodos genéricos para acesso à dados</a:t>
+            </a:r>
+          </a:p>
+        </p:txBody>
+      </p:sp>
+      <p:pic>
+        <p:nvPicPr>
+          <p:cNvPr id="3" name="Imagem 2">
+            <a:extLst>
+              <a:ext uri="{FF2B5EF4-FFF2-40B4-BE49-F238E27FC236}">
+                <a16:creationId xmlns:a16="http://schemas.microsoft.com/office/drawing/2014/main" id="{F512644F-8170-41DC-B30E-6CE353BC9809}"/>
+              </a:ext>
+            </a:extLst>
+          </p:cNvPr>
+          <p:cNvPicPr>
+            <a:picLocks noChangeAspect="1"/>
+          </p:cNvPicPr>
+          <p:nvPr/>
+        </p:nvPicPr>
+        <p:blipFill>
+          <a:blip r:embed="rId2"/>
+          <a:stretch>
+            <a:fillRect/>
+          </a:stretch>
+        </p:blipFill>
+        <p:spPr>
+          <a:xfrm>
+            <a:off x="365765" y="676011"/>
+            <a:ext cx="3972971" cy="601143"/>
+          </a:xfrm>
+          <a:prstGeom prst="rect">
+            <a:avLst/>
+          </a:prstGeom>
+        </p:spPr>
+      </p:pic>
+      <p:pic>
+        <p:nvPicPr>
+          <p:cNvPr id="5" name="Imagem 4">
+            <a:extLst>
+              <a:ext uri="{FF2B5EF4-FFF2-40B4-BE49-F238E27FC236}">
+                <a16:creationId xmlns:a16="http://schemas.microsoft.com/office/drawing/2014/main" id="{B718A4BF-8C14-44F8-AA1D-5079EA283A37}"/>
+              </a:ext>
+            </a:extLst>
+          </p:cNvPr>
+          <p:cNvPicPr>
+            <a:picLocks noChangeAspect="1"/>
+          </p:cNvPicPr>
+          <p:nvPr/>
+        </p:nvPicPr>
+        <p:blipFill>
+          <a:blip r:embed="rId3"/>
+          <a:stretch>
+            <a:fillRect/>
+          </a:stretch>
+        </p:blipFill>
+        <p:spPr>
+          <a:xfrm>
+            <a:off x="365765" y="1365241"/>
+            <a:ext cx="3972970" cy="5191874"/>
+          </a:xfrm>
+          <a:prstGeom prst="rect">
+            <a:avLst/>
+          </a:prstGeom>
+        </p:spPr>
+      </p:pic>
+      <p:sp>
+        <p:nvSpPr>
+          <p:cNvPr id="6" name="CaixaDeTexto 5">
+            <a:extLst>
+              <a:ext uri="{FF2B5EF4-FFF2-40B4-BE49-F238E27FC236}">
+                <a16:creationId xmlns:a16="http://schemas.microsoft.com/office/drawing/2014/main" id="{44CA3AE3-FF9E-4984-B084-76CA19424BF5}"/>
+              </a:ext>
+            </a:extLst>
+          </p:cNvPr>
+          <p:cNvSpPr txBox="1"/>
+          <p:nvPr/>
+        </p:nvSpPr>
+        <p:spPr>
+          <a:xfrm>
+            <a:off x="5159829" y="676011"/>
+            <a:ext cx="6480629" cy="4247317"/>
+          </a:xfrm>
+          <a:prstGeom prst="rect">
+            <a:avLst/>
+          </a:prstGeom>
+          <a:noFill/>
+        </p:spPr>
+        <p:txBody>
+          <a:bodyPr wrap="square" rtlCol="0">
+            <a:spAutoFit/>
+          </a:bodyPr>
+          <a:lstStyle/>
+          <a:p>
+            <a:r>
+              <a:rPr lang="pt-BR" dirty="0"/>
+              <a:t>Nós vamos definir nossa </a:t>
+            </a:r>
+            <a:r>
+              <a:rPr lang="pt-BR" dirty="0" err="1"/>
+              <a:t>string</a:t>
+            </a:r>
+            <a:r>
+              <a:rPr lang="pt-BR" dirty="0"/>
+              <a:t> de conexão no arquivo </a:t>
+            </a:r>
+            <a:r>
+              <a:rPr lang="pt-BR" b="1" dirty="0" err="1"/>
+              <a:t>appsettings.json</a:t>
+            </a:r>
+            <a:r>
+              <a:rPr lang="pt-BR" b="1" dirty="0"/>
+              <a:t> </a:t>
+            </a:r>
+            <a:r>
+              <a:rPr lang="pt-BR" dirty="0"/>
+              <a:t>na camada da API (Posteriormente falaremos mais sobre este arquivo).</a:t>
+            </a:r>
+          </a:p>
+          <a:p>
+            <a:endParaRPr lang="pt-BR" dirty="0"/>
+          </a:p>
+          <a:p>
+            <a:r>
+              <a:rPr lang="pt-BR" dirty="0"/>
+              <a:t>Posteriormente já na camada de acesso à dados nós iremos criar uma classe genérica que irá realizar as operações que são comuns à nossas entidades o chamado (CRUD). Podemos observar que nossa classe recebe um tipo genérico </a:t>
+            </a:r>
+            <a:r>
+              <a:rPr lang="pt-BR" b="1" dirty="0"/>
+              <a:t>T</a:t>
+            </a:r>
+            <a:r>
+              <a:rPr lang="pt-BR" dirty="0"/>
+              <a:t>, (logo mais aprenderemos mais sobre tipos genéricos) e baseado neste tipo definiremos os métodos comuns.</a:t>
+            </a:r>
+          </a:p>
+          <a:p>
+            <a:endParaRPr lang="pt-BR" dirty="0"/>
+          </a:p>
+          <a:p>
+            <a:r>
+              <a:rPr lang="pt-BR" dirty="0"/>
+              <a:t>Para realizar as operações no banco de dados utilizaremos um </a:t>
+            </a:r>
+            <a:r>
+              <a:rPr lang="pt-BR" dirty="0" err="1"/>
+              <a:t>Micro-ORM</a:t>
+            </a:r>
+            <a:r>
+              <a:rPr lang="pt-BR" dirty="0"/>
+              <a:t> chamado </a:t>
+            </a:r>
+            <a:r>
+              <a:rPr lang="pt-BR" dirty="0" err="1"/>
+              <a:t>Dapper</a:t>
+            </a:r>
+            <a:r>
+              <a:rPr lang="pt-BR" dirty="0"/>
+              <a:t> e atrelado a ele algumas outras bibliotecas que nos auxiliarão na comunicação com o bando de dados. </a:t>
+            </a:r>
+          </a:p>
+        </p:txBody>
+      </p:sp>
+      <p:pic>
+        <p:nvPicPr>
+          <p:cNvPr id="7" name="Imagem 6">
+            <a:extLst>
+              <a:ext uri="{FF2B5EF4-FFF2-40B4-BE49-F238E27FC236}">
+                <a16:creationId xmlns:a16="http://schemas.microsoft.com/office/drawing/2014/main" id="{9E333725-B193-4B9D-926C-D9B218E12BF0}"/>
+              </a:ext>
+            </a:extLst>
+          </p:cNvPr>
+          <p:cNvPicPr>
+            <a:picLocks noChangeAspect="1"/>
+          </p:cNvPicPr>
+          <p:nvPr/>
+        </p:nvPicPr>
+        <p:blipFill>
+          <a:blip r:embed="rId4"/>
+          <a:stretch>
+            <a:fillRect/>
+          </a:stretch>
+        </p:blipFill>
+        <p:spPr>
+          <a:xfrm>
+            <a:off x="6413657" y="4923328"/>
+            <a:ext cx="3972971" cy="1582271"/>
+          </a:xfrm>
+          <a:prstGeom prst="rect">
+            <a:avLst/>
+          </a:prstGeom>
+        </p:spPr>
+      </p:pic>
+    </p:spTree>
+    <p:extLst>
+      <p:ext uri="{BB962C8B-B14F-4D97-AF65-F5344CB8AC3E}">
+        <p14:creationId xmlns:p14="http://schemas.microsoft.com/office/powerpoint/2010/main" val="2752593974"/>
+      </p:ext>
+    </p:extLst>
+  </p:cSld>
+  <p:clrMapOvr>
+    <a:masterClrMapping/>
+  </p:clrMapOvr>
+</p:sld>
+</file>
+
+<file path=ppt/slides/slide14.xml><?xml version="1.0" encoding="utf-8"?>
+<p:sld xmlns:a="http://schemas.openxmlformats.org/drawingml/2006/main" xmlns:r="http://schemas.openxmlformats.org/officeDocument/2006/relationships" xmlns:p="http://schemas.openxmlformats.org/presentationml/2006/main">
+  <p:cSld>
+    <p:spTree>
+      <p:nvGrpSpPr>
+        <p:cNvPr id="1" name=""/>
+        <p:cNvGrpSpPr/>
+        <p:nvPr/>
+      </p:nvGrpSpPr>
+      <p:grpSpPr>
+        <a:xfrm>
+          <a:off x="0" y="0"/>
+          <a:ext cx="0" cy="0"/>
+          <a:chOff x="0" y="0"/>
+          <a:chExt cx="0" cy="0"/>
+        </a:xfrm>
+      </p:grpSpPr>
+      <p:sp>
+        <p:nvSpPr>
+          <p:cNvPr id="2" name="CaixaDeTexto 1">
+            <a:extLst>
+              <a:ext uri="{FF2B5EF4-FFF2-40B4-BE49-F238E27FC236}">
+                <a16:creationId xmlns:a16="http://schemas.microsoft.com/office/drawing/2014/main" id="{85E528EF-B7C3-4219-8F17-8A098008A516}"/>
+              </a:ext>
+            </a:extLst>
+          </p:cNvPr>
+          <p:cNvSpPr txBox="1"/>
+          <p:nvPr/>
+        </p:nvSpPr>
+        <p:spPr>
+          <a:xfrm>
+            <a:off x="365765" y="126259"/>
+            <a:ext cx="2153154" cy="461665"/>
+          </a:xfrm>
+          <a:prstGeom prst="rect">
+            <a:avLst/>
+          </a:prstGeom>
+          <a:noFill/>
+        </p:spPr>
+        <p:txBody>
+          <a:bodyPr wrap="none" rtlCol="0">
+            <a:spAutoFit/>
+          </a:bodyPr>
+          <a:lstStyle/>
+          <a:p>
+            <a:r>
+              <a:rPr lang="pt-BR" sz="2400" b="1" dirty="0"/>
+              <a:t>Tipos genéricos</a:t>
+            </a:r>
+          </a:p>
+        </p:txBody>
+      </p:sp>
+      <p:pic>
+        <p:nvPicPr>
+          <p:cNvPr id="3" name="Imagem 2">
+            <a:extLst>
+              <a:ext uri="{FF2B5EF4-FFF2-40B4-BE49-F238E27FC236}">
+                <a16:creationId xmlns:a16="http://schemas.microsoft.com/office/drawing/2014/main" id="{6B343AA3-2918-4840-88D8-5B3D4951E984}"/>
+              </a:ext>
+            </a:extLst>
+          </p:cNvPr>
+          <p:cNvPicPr>
+            <a:picLocks noChangeAspect="1"/>
+          </p:cNvPicPr>
+          <p:nvPr/>
+        </p:nvPicPr>
+        <p:blipFill>
+          <a:blip r:embed="rId2"/>
+          <a:stretch>
+            <a:fillRect/>
+          </a:stretch>
+        </p:blipFill>
+        <p:spPr>
+          <a:xfrm>
+            <a:off x="2276475" y="1067675"/>
+            <a:ext cx="7639050" cy="523875"/>
+          </a:xfrm>
+          <a:prstGeom prst="rect">
+            <a:avLst/>
+          </a:prstGeom>
+        </p:spPr>
+      </p:pic>
+      <p:sp>
+        <p:nvSpPr>
+          <p:cNvPr id="5" name="CaixaDeTexto 4">
+            <a:extLst>
+              <a:ext uri="{FF2B5EF4-FFF2-40B4-BE49-F238E27FC236}">
+                <a16:creationId xmlns:a16="http://schemas.microsoft.com/office/drawing/2014/main" id="{9DF427A6-A44A-487F-93C3-5366D0C78724}"/>
+              </a:ext>
+            </a:extLst>
+          </p:cNvPr>
+          <p:cNvSpPr txBox="1"/>
+          <p:nvPr/>
+        </p:nvSpPr>
+        <p:spPr>
+          <a:xfrm>
+            <a:off x="1245442" y="2071301"/>
+            <a:ext cx="9701116" cy="2862322"/>
+          </a:xfrm>
+          <a:prstGeom prst="rect">
+            <a:avLst/>
+          </a:prstGeom>
+          <a:noFill/>
+        </p:spPr>
+        <p:txBody>
+          <a:bodyPr wrap="square" rtlCol="0">
+            <a:spAutoFit/>
+          </a:bodyPr>
+          <a:lstStyle/>
+          <a:p>
+            <a:pPr algn="ctr"/>
+            <a:r>
+              <a:rPr lang="pt-BR" dirty="0"/>
+              <a:t>Um tipo genérico, comumente denominado “</a:t>
+            </a:r>
+            <a:r>
+              <a:rPr lang="pt-BR" b="1" dirty="0"/>
+              <a:t>T”</a:t>
+            </a:r>
+            <a:r>
+              <a:rPr lang="pt-BR" dirty="0"/>
+              <a:t> (tal qual o “</a:t>
+            </a:r>
+            <a:r>
+              <a:rPr lang="pt-BR" b="1" dirty="0"/>
+              <a:t>i”</a:t>
+            </a:r>
+            <a:r>
+              <a:rPr lang="pt-BR" dirty="0"/>
+              <a:t> para o for) é utilizado normalmente por algumas classes que adicionam funcionalidades a outras classes.</a:t>
+            </a:r>
+          </a:p>
+          <a:p>
+            <a:pPr algn="ctr"/>
+            <a:endParaRPr lang="pt-BR" dirty="0"/>
+          </a:p>
+          <a:p>
+            <a:pPr algn="ctr"/>
+            <a:r>
+              <a:rPr lang="pt-BR" dirty="0"/>
+              <a:t>No exemplo acima vemos a declaração de uma classe chamada </a:t>
+            </a:r>
+            <a:r>
+              <a:rPr lang="pt-BR" dirty="0" err="1"/>
+              <a:t>BaseDao</a:t>
+            </a:r>
+            <a:r>
+              <a:rPr lang="pt-BR" dirty="0"/>
+              <a:t> que estará adicionando funcionalidades à outra classe (No momento da declaração utilizamos T). Outro ponto que deve ser destacado é que podemos adicionar </a:t>
+            </a:r>
+            <a:r>
+              <a:rPr lang="pt-BR" dirty="0" err="1"/>
+              <a:t>constraints</a:t>
+            </a:r>
+            <a:r>
+              <a:rPr lang="pt-BR" dirty="0"/>
+              <a:t> (restrições) ao tipo da classe que poderá “tomar o lugar de T”, neste caso, somente classes que implementam a interface </a:t>
+            </a:r>
+            <a:r>
+              <a:rPr lang="pt-BR" b="1" dirty="0" err="1"/>
+              <a:t>IBaseDomain</a:t>
+            </a:r>
+            <a:r>
+              <a:rPr lang="pt-BR" dirty="0"/>
+              <a:t> poderão ser passadas para a classe </a:t>
+            </a:r>
+            <a:r>
+              <a:rPr lang="pt-BR" b="1" dirty="0" err="1"/>
+              <a:t>BaseDao</a:t>
+            </a:r>
+            <a:r>
+              <a:rPr lang="pt-BR" dirty="0"/>
+              <a:t>.</a:t>
+            </a:r>
+          </a:p>
+          <a:p>
+            <a:pPr algn="ctr"/>
+            <a:endParaRPr lang="pt-BR" dirty="0"/>
+          </a:p>
+          <a:p>
+            <a:pPr algn="ctr"/>
+            <a:r>
+              <a:rPr lang="pt-BR" dirty="0"/>
+              <a:t>Abaixo temos um exemplo da utilização da classe genérica:</a:t>
+            </a:r>
+          </a:p>
+        </p:txBody>
+      </p:sp>
+      <p:pic>
+        <p:nvPicPr>
+          <p:cNvPr id="6" name="Imagem 5">
+            <a:extLst>
+              <a:ext uri="{FF2B5EF4-FFF2-40B4-BE49-F238E27FC236}">
+                <a16:creationId xmlns:a16="http://schemas.microsoft.com/office/drawing/2014/main" id="{886CDEEB-2C3C-4EB5-A0C2-E1FE3C5CD5EC}"/>
+              </a:ext>
+            </a:extLst>
+          </p:cNvPr>
+          <p:cNvPicPr>
+            <a:picLocks noChangeAspect="1"/>
+          </p:cNvPicPr>
+          <p:nvPr/>
+        </p:nvPicPr>
+        <p:blipFill>
+          <a:blip r:embed="rId3"/>
+          <a:stretch>
+            <a:fillRect/>
+          </a:stretch>
+        </p:blipFill>
+        <p:spPr>
+          <a:xfrm>
+            <a:off x="3852862" y="5413374"/>
+            <a:ext cx="4486275" cy="476250"/>
+          </a:xfrm>
+          <a:prstGeom prst="rect">
+            <a:avLst/>
+          </a:prstGeom>
+        </p:spPr>
+      </p:pic>
+    </p:spTree>
+    <p:extLst>
+      <p:ext uri="{BB962C8B-B14F-4D97-AF65-F5344CB8AC3E}">
+        <p14:creationId xmlns:p14="http://schemas.microsoft.com/office/powerpoint/2010/main" val="1826284375"/>
+      </p:ext>
+    </p:extLst>
+  </p:cSld>
+  <p:clrMapOvr>
+    <a:masterClrMapping/>
+  </p:clrMapOvr>
+</p:sld>
+</file>
+
+<file path=ppt/slides/slide15.xml><?xml version="1.0" encoding="utf-8"?>
+<p:sld xmlns:a="http://schemas.openxmlformats.org/drawingml/2006/main" xmlns:r="http://schemas.openxmlformats.org/officeDocument/2006/relationships" xmlns:p="http://schemas.openxmlformats.org/presentationml/2006/main">
+  <p:cSld>
+    <p:spTree>
+      <p:nvGrpSpPr>
+        <p:cNvPr id="1" name=""/>
+        <p:cNvGrpSpPr/>
+        <p:nvPr/>
+      </p:nvGrpSpPr>
+      <p:grpSpPr>
+        <a:xfrm>
+          <a:off x="0" y="0"/>
+          <a:ext cx="0" cy="0"/>
+          <a:chOff x="0" y="0"/>
+          <a:chExt cx="0" cy="0"/>
+        </a:xfrm>
+      </p:grpSpPr>
+      <p:sp>
+        <p:nvSpPr>
+          <p:cNvPr id="2" name="CaixaDeTexto 1">
+            <a:extLst>
+              <a:ext uri="{FF2B5EF4-FFF2-40B4-BE49-F238E27FC236}">
+                <a16:creationId xmlns:a16="http://schemas.microsoft.com/office/drawing/2014/main" id="{A0764E36-B0BD-47DB-B972-6E292179A1FC}"/>
+              </a:ext>
+            </a:extLst>
+          </p:cNvPr>
+          <p:cNvSpPr txBox="1"/>
+          <p:nvPr/>
+        </p:nvSpPr>
+        <p:spPr>
+          <a:xfrm>
+            <a:off x="365765" y="126259"/>
+            <a:ext cx="2657522" cy="461665"/>
+          </a:xfrm>
+          <a:prstGeom prst="rect">
+            <a:avLst/>
+          </a:prstGeom>
+          <a:noFill/>
+        </p:spPr>
+        <p:txBody>
+          <a:bodyPr wrap="none" rtlCol="0">
+            <a:spAutoFit/>
+          </a:bodyPr>
+          <a:lstStyle/>
+          <a:p>
+            <a:r>
+              <a:rPr lang="pt-BR" sz="2400" b="1" dirty="0"/>
+              <a:t>Micro ORM </a:t>
+            </a:r>
+            <a:r>
+              <a:rPr lang="pt-BR" sz="2400" b="1" dirty="0" err="1"/>
+              <a:t>Dapper</a:t>
+            </a:r>
+            <a:endParaRPr lang="pt-BR" sz="2400" b="1" dirty="0"/>
+          </a:p>
+        </p:txBody>
+      </p:sp>
+      <p:sp>
+        <p:nvSpPr>
+          <p:cNvPr id="3" name="CaixaDeTexto 2">
+            <a:extLst>
+              <a:ext uri="{FF2B5EF4-FFF2-40B4-BE49-F238E27FC236}">
+                <a16:creationId xmlns:a16="http://schemas.microsoft.com/office/drawing/2014/main" id="{E4264A9F-F09B-4877-AF7A-C732BF07C4CF}"/>
+              </a:ext>
+            </a:extLst>
+          </p:cNvPr>
+          <p:cNvSpPr txBox="1"/>
+          <p:nvPr/>
+        </p:nvSpPr>
+        <p:spPr>
+          <a:xfrm>
+            <a:off x="1245442" y="1028343"/>
+            <a:ext cx="9701116" cy="4801314"/>
+          </a:xfrm>
+          <a:prstGeom prst="rect">
+            <a:avLst/>
+          </a:prstGeom>
+          <a:noFill/>
+        </p:spPr>
+        <p:txBody>
+          <a:bodyPr wrap="square" rtlCol="0">
+            <a:spAutoFit/>
+          </a:bodyPr>
+          <a:lstStyle/>
+          <a:p>
+            <a:pPr algn="ctr"/>
+            <a:r>
+              <a:rPr lang="pt-BR" dirty="0"/>
+              <a:t>Nos últimos anos a utilização de ferramentas ORM como o </a:t>
+            </a:r>
+            <a:r>
+              <a:rPr lang="pt-BR" dirty="0" err="1"/>
+              <a:t>NHibernate</a:t>
+            </a:r>
+            <a:r>
+              <a:rPr lang="pt-BR" dirty="0"/>
+              <a:t> e o </a:t>
+            </a:r>
+            <a:r>
+              <a:rPr lang="pt-BR" dirty="0" err="1"/>
+              <a:t>Entity</a:t>
+            </a:r>
+            <a:r>
+              <a:rPr lang="pt-BR" dirty="0"/>
+              <a:t> Framework têm crescido muito, afinal trabalhar com classes e objetos e abstrair os comandos SQL e os objetos da ADO .NET torna o trabalho mais simples, visto que a ferramenta ORM pode realizar o trabalho de mapeamento entre as tabelas e as entidades para nós de forma automática.</a:t>
+            </a:r>
+          </a:p>
+          <a:p>
+            <a:pPr algn="ctr"/>
+            <a:r>
+              <a:rPr lang="pt-BR" dirty="0"/>
+              <a:t>Infelizmente neste mundo nada é perfeito, e, usar uma ferramenta ORM sem conhecer muito bem o seu funcionamento pode camuflar problemas gravíssimos em uma aplicação mesmo que ele continue funcionando sem erros. (</a:t>
+            </a:r>
+            <a:r>
+              <a:rPr lang="pt-BR" b="1" dirty="0"/>
+              <a:t>O problema </a:t>
+            </a:r>
+            <a:r>
+              <a:rPr lang="pt-BR" b="1" dirty="0" err="1"/>
+              <a:t>Select</a:t>
+            </a:r>
+            <a:r>
+              <a:rPr lang="pt-BR" b="1" dirty="0"/>
+              <a:t> + 1).  </a:t>
+            </a:r>
+            <a:r>
+              <a:rPr lang="pt-BR" dirty="0"/>
+              <a:t>Outro problema é que o código gerado pelo ORM pode ser muito complexo e difícil de otimizar.</a:t>
+            </a:r>
+          </a:p>
+          <a:p>
+            <a:pPr algn="ctr"/>
+            <a:r>
+              <a:rPr lang="pt-BR" dirty="0"/>
+              <a:t>Acresça a tudo isso o fato de que quando você usa uma ferramenta ORM você esta incluindo uma camada a mais na sua aplicação e isso vai afetar o seu desempenho de uma forma mais ou menos sensível dependendo de como você usou a ferramenta ORM.  No caso do </a:t>
+            </a:r>
+            <a:r>
+              <a:rPr lang="pt-BR" dirty="0" err="1"/>
+              <a:t>Entity</a:t>
+            </a:r>
+            <a:r>
+              <a:rPr lang="pt-BR" dirty="0"/>
+              <a:t> Framework e o </a:t>
+            </a:r>
+            <a:r>
+              <a:rPr lang="pt-BR" dirty="0" err="1"/>
+              <a:t>Linq</a:t>
+            </a:r>
+            <a:r>
+              <a:rPr lang="pt-BR" dirty="0"/>
+              <a:t> </a:t>
+            </a:r>
+            <a:r>
+              <a:rPr lang="pt-BR" dirty="0" err="1"/>
+              <a:t>to</a:t>
+            </a:r>
+            <a:r>
+              <a:rPr lang="pt-BR" dirty="0"/>
+              <a:t> SQL ambos utilizam expressões LINQ causando sobrecarga no desempenho ao traduzir as instruções SQL nativas.</a:t>
+            </a:r>
+          </a:p>
+          <a:p>
+            <a:pPr algn="ctr"/>
+            <a:r>
+              <a:rPr lang="pt-BR" dirty="0"/>
+              <a:t>Neste cenário foi que surgiram os Micros ORM criados diretamente sobre ADO  .NET e com uma proposta de aumentar o desempenho das iterações com o banco de dados relacionais. De forma bem simplificada, eles usam </a:t>
+            </a:r>
+            <a:r>
+              <a:rPr lang="pt-BR" b="1" dirty="0" err="1"/>
+              <a:t>Reflection</a:t>
+            </a:r>
+            <a:r>
+              <a:rPr lang="pt-BR" i="1" dirty="0"/>
+              <a:t>(</a:t>
+            </a:r>
+            <a:r>
+              <a:rPr lang="pt-BR" i="1" dirty="0" err="1"/>
+              <a:t>dynamic</a:t>
+            </a:r>
+            <a:r>
+              <a:rPr lang="pt-BR" i="1" dirty="0"/>
+              <a:t> a partir da versão 4.0 da plataforma .NET) </a:t>
+            </a:r>
+            <a:r>
+              <a:rPr lang="pt-BR" dirty="0"/>
+              <a:t>para gerar objetos a partir do resultado da leitura dos dados.</a:t>
+            </a:r>
+          </a:p>
+        </p:txBody>
+      </p:sp>
+    </p:spTree>
+    <p:extLst>
+      <p:ext uri="{BB962C8B-B14F-4D97-AF65-F5344CB8AC3E}">
+        <p14:creationId xmlns:p14="http://schemas.microsoft.com/office/powerpoint/2010/main" val="1398310040"/>
+      </p:ext>
+    </p:extLst>
+  </p:cSld>
+  <p:clrMapOvr>
+    <a:masterClrMapping/>
+  </p:clrMapOvr>
+</p:sld>
+</file>
+
+<file path=ppt/slides/slide16.xml><?xml version="1.0" encoding="utf-8"?>
+<p:sld xmlns:a="http://schemas.openxmlformats.org/drawingml/2006/main" xmlns:r="http://schemas.openxmlformats.org/officeDocument/2006/relationships" xmlns:p="http://schemas.openxmlformats.org/presentationml/2006/main">
+  <p:cSld>
+    <p:spTree>
+      <p:nvGrpSpPr>
+        <p:cNvPr id="1" name=""/>
+        <p:cNvGrpSpPr/>
+        <p:nvPr/>
+      </p:nvGrpSpPr>
+      <p:grpSpPr>
+        <a:xfrm>
+          <a:off x="0" y="0"/>
+          <a:ext cx="0" cy="0"/>
+          <a:chOff x="0" y="0"/>
+          <a:chExt cx="0" cy="0"/>
+        </a:xfrm>
+      </p:grpSpPr>
+      <p:sp>
+        <p:nvSpPr>
+          <p:cNvPr id="2" name="CaixaDeTexto 1">
+            <a:extLst>
+              <a:ext uri="{FF2B5EF4-FFF2-40B4-BE49-F238E27FC236}">
+                <a16:creationId xmlns:a16="http://schemas.microsoft.com/office/drawing/2014/main" id="{59EA05BE-4745-47D8-9CFB-56933FB4BEB0}"/>
+              </a:ext>
+            </a:extLst>
+          </p:cNvPr>
+          <p:cNvSpPr txBox="1"/>
+          <p:nvPr/>
+        </p:nvSpPr>
+        <p:spPr>
+          <a:xfrm>
+            <a:off x="365765" y="126259"/>
+            <a:ext cx="5262787" cy="461665"/>
+          </a:xfrm>
+          <a:prstGeom prst="rect">
+            <a:avLst/>
+          </a:prstGeom>
+          <a:noFill/>
+        </p:spPr>
+        <p:txBody>
+          <a:bodyPr wrap="none" rtlCol="0">
+            <a:spAutoFit/>
+          </a:bodyPr>
+          <a:lstStyle/>
+          <a:p>
+            <a:r>
+              <a:rPr lang="pt-BR" sz="2400" b="1" dirty="0"/>
+              <a:t>9. Criação das classes de acesso à dados</a:t>
+            </a:r>
+          </a:p>
+        </p:txBody>
+      </p:sp>
+      <p:pic>
+        <p:nvPicPr>
+          <p:cNvPr id="3" name="Imagem 2">
+            <a:extLst>
+              <a:ext uri="{FF2B5EF4-FFF2-40B4-BE49-F238E27FC236}">
+                <a16:creationId xmlns:a16="http://schemas.microsoft.com/office/drawing/2014/main" id="{37868E35-4BB0-426E-BBF0-49B5D8697D73}"/>
+              </a:ext>
+            </a:extLst>
+          </p:cNvPr>
+          <p:cNvPicPr>
+            <a:picLocks noChangeAspect="1"/>
+          </p:cNvPicPr>
+          <p:nvPr/>
+        </p:nvPicPr>
+        <p:blipFill>
+          <a:blip r:embed="rId2"/>
+          <a:stretch>
+            <a:fillRect/>
+          </a:stretch>
+        </p:blipFill>
+        <p:spPr>
+          <a:xfrm>
+            <a:off x="365765" y="801509"/>
+            <a:ext cx="2830905" cy="1285990"/>
+          </a:xfrm>
+          <a:prstGeom prst="rect">
+            <a:avLst/>
+          </a:prstGeom>
+        </p:spPr>
+      </p:pic>
+      <p:pic>
+        <p:nvPicPr>
+          <p:cNvPr id="4" name="Imagem 3">
+            <a:extLst>
+              <a:ext uri="{FF2B5EF4-FFF2-40B4-BE49-F238E27FC236}">
+                <a16:creationId xmlns:a16="http://schemas.microsoft.com/office/drawing/2014/main" id="{A82A69EF-778D-4207-8868-60C6232F2AA2}"/>
+              </a:ext>
+            </a:extLst>
+          </p:cNvPr>
+          <p:cNvPicPr>
+            <a:picLocks noChangeAspect="1"/>
+          </p:cNvPicPr>
+          <p:nvPr/>
+        </p:nvPicPr>
+        <p:blipFill>
+          <a:blip r:embed="rId3"/>
+          <a:stretch>
+            <a:fillRect/>
+          </a:stretch>
+        </p:blipFill>
+        <p:spPr>
+          <a:xfrm>
+            <a:off x="365765" y="2301084"/>
+            <a:ext cx="3590416" cy="1329144"/>
+          </a:xfrm>
+          <a:prstGeom prst="rect">
+            <a:avLst/>
+          </a:prstGeom>
+        </p:spPr>
+      </p:pic>
+      <p:pic>
+        <p:nvPicPr>
+          <p:cNvPr id="5" name="Imagem 4">
+            <a:extLst>
+              <a:ext uri="{FF2B5EF4-FFF2-40B4-BE49-F238E27FC236}">
+                <a16:creationId xmlns:a16="http://schemas.microsoft.com/office/drawing/2014/main" id="{8276C3B0-0BD5-455A-ABB3-14A7BA52507C}"/>
+              </a:ext>
+            </a:extLst>
+          </p:cNvPr>
+          <p:cNvPicPr>
+            <a:picLocks noChangeAspect="1"/>
+          </p:cNvPicPr>
+          <p:nvPr/>
+        </p:nvPicPr>
+        <p:blipFill>
+          <a:blip r:embed="rId4"/>
+          <a:stretch>
+            <a:fillRect/>
+          </a:stretch>
+        </p:blipFill>
+        <p:spPr>
+          <a:xfrm>
+            <a:off x="365765" y="3843813"/>
+            <a:ext cx="4971345" cy="2623765"/>
+          </a:xfrm>
+          <a:prstGeom prst="rect">
+            <a:avLst/>
+          </a:prstGeom>
+        </p:spPr>
+      </p:pic>
+      <p:sp>
+        <p:nvSpPr>
+          <p:cNvPr id="6" name="CaixaDeTexto 5">
+            <a:extLst>
+              <a:ext uri="{FF2B5EF4-FFF2-40B4-BE49-F238E27FC236}">
+                <a16:creationId xmlns:a16="http://schemas.microsoft.com/office/drawing/2014/main" id="{C47DDAF8-46D2-4658-9A29-FCD5BA7C9762}"/>
+              </a:ext>
+            </a:extLst>
+          </p:cNvPr>
+          <p:cNvSpPr txBox="1"/>
+          <p:nvPr/>
+        </p:nvSpPr>
+        <p:spPr>
+          <a:xfrm>
+            <a:off x="6394579" y="1849119"/>
+            <a:ext cx="4949184" cy="2585323"/>
+          </a:xfrm>
+          <a:prstGeom prst="rect">
+            <a:avLst/>
+          </a:prstGeom>
+          <a:noFill/>
+        </p:spPr>
+        <p:txBody>
+          <a:bodyPr wrap="square" rtlCol="0">
+            <a:spAutoFit/>
+          </a:bodyPr>
+          <a:lstStyle/>
+          <a:p>
+            <a:r>
+              <a:rPr lang="pt-BR" dirty="0"/>
+              <a:t>Temos aqui exemplos de implantação das classes de acesso à dados que herdam da nossa classe base. Vale ressaltar que elas já possuem os métodos de listar, encontrar, inserir, alterar e remover que vêm da classe pai.</a:t>
+            </a:r>
+          </a:p>
+          <a:p>
+            <a:endParaRPr lang="pt-BR" dirty="0"/>
+          </a:p>
+          <a:p>
+            <a:r>
+              <a:rPr lang="pt-BR" dirty="0"/>
+              <a:t>Na classe </a:t>
+            </a:r>
+            <a:r>
+              <a:rPr lang="pt-BR" b="1" dirty="0" err="1"/>
+              <a:t>ProdutoDao</a:t>
+            </a:r>
+            <a:r>
+              <a:rPr lang="pt-BR" dirty="0"/>
+              <a:t> vemos que podemos criar outros métodos para ela além dos que já são implementados pela classe pai.</a:t>
+            </a:r>
+          </a:p>
+        </p:txBody>
+      </p:sp>
+    </p:spTree>
+    <p:extLst>
+      <p:ext uri="{BB962C8B-B14F-4D97-AF65-F5344CB8AC3E}">
+        <p14:creationId xmlns:p14="http://schemas.microsoft.com/office/powerpoint/2010/main" val="2738685479"/>
+      </p:ext>
+    </p:extLst>
+  </p:cSld>
+  <p:clrMapOvr>
+    <a:masterClrMapping/>
+  </p:clrMapOvr>
+</p:sld>
+</file>
+
+<file path=ppt/slides/slide17.xml><?xml version="1.0" encoding="utf-8"?>
+<p:sld xmlns:a="http://schemas.openxmlformats.org/drawingml/2006/main" xmlns:r="http://schemas.openxmlformats.org/officeDocument/2006/relationships" xmlns:p="http://schemas.openxmlformats.org/presentationml/2006/main">
+  <p:cSld>
+    <p:spTree>
+      <p:nvGrpSpPr>
+        <p:cNvPr id="1" name=""/>
+        <p:cNvGrpSpPr/>
+        <p:nvPr/>
+      </p:nvGrpSpPr>
+      <p:grpSpPr>
+        <a:xfrm>
+          <a:off x="0" y="0"/>
+          <a:ext cx="0" cy="0"/>
+          <a:chOff x="0" y="0"/>
+          <a:chExt cx="0" cy="0"/>
+        </a:xfrm>
+      </p:grpSpPr>
+      <p:sp>
+        <p:nvSpPr>
+          <p:cNvPr id="2" name="CaixaDeTexto 1">
+            <a:extLst>
+              <a:ext uri="{FF2B5EF4-FFF2-40B4-BE49-F238E27FC236}">
+                <a16:creationId xmlns:a16="http://schemas.microsoft.com/office/drawing/2014/main" id="{A5508EE0-1B9A-4DC8-BE92-F5D662EF74DD}"/>
+              </a:ext>
+            </a:extLst>
+          </p:cNvPr>
+          <p:cNvSpPr txBox="1"/>
+          <p:nvPr/>
+        </p:nvSpPr>
+        <p:spPr>
+          <a:xfrm>
+            <a:off x="365765" y="126259"/>
+            <a:ext cx="3325269" cy="461665"/>
+          </a:xfrm>
+          <a:prstGeom prst="rect">
+            <a:avLst/>
+          </a:prstGeom>
+          <a:noFill/>
+        </p:spPr>
+        <p:txBody>
+          <a:bodyPr wrap="none" rtlCol="0">
+            <a:spAutoFit/>
+          </a:bodyPr>
+          <a:lstStyle/>
+          <a:p>
+            <a:r>
+              <a:rPr lang="pt-BR" sz="2400" b="1" dirty="0"/>
+              <a:t>10. Mapear as entidades</a:t>
+            </a:r>
+          </a:p>
+        </p:txBody>
+      </p:sp>
+      <p:pic>
+        <p:nvPicPr>
+          <p:cNvPr id="3" name="Imagem 2">
+            <a:extLst>
+              <a:ext uri="{FF2B5EF4-FFF2-40B4-BE49-F238E27FC236}">
+                <a16:creationId xmlns:a16="http://schemas.microsoft.com/office/drawing/2014/main" id="{7F4B9445-A365-4907-89EC-BC8419AD9320}"/>
+              </a:ext>
+            </a:extLst>
+          </p:cNvPr>
+          <p:cNvPicPr>
+            <a:picLocks noChangeAspect="1"/>
+          </p:cNvPicPr>
+          <p:nvPr/>
+        </p:nvPicPr>
+        <p:blipFill>
+          <a:blip r:embed="rId2"/>
+          <a:stretch>
+            <a:fillRect/>
+          </a:stretch>
+        </p:blipFill>
+        <p:spPr>
+          <a:xfrm>
+            <a:off x="365765" y="587924"/>
+            <a:ext cx="3596299" cy="2553674"/>
+          </a:xfrm>
+          <a:prstGeom prst="rect">
+            <a:avLst/>
+          </a:prstGeom>
+        </p:spPr>
+      </p:pic>
+      <p:sp>
+        <p:nvSpPr>
+          <p:cNvPr id="4" name="CaixaDeTexto 3">
+            <a:extLst>
+              <a:ext uri="{FF2B5EF4-FFF2-40B4-BE49-F238E27FC236}">
+                <a16:creationId xmlns:a16="http://schemas.microsoft.com/office/drawing/2014/main" id="{761D1340-37F0-4AE0-A7C3-32BA3B0F2A91}"/>
+              </a:ext>
+            </a:extLst>
+          </p:cNvPr>
+          <p:cNvSpPr txBox="1"/>
+          <p:nvPr/>
+        </p:nvSpPr>
+        <p:spPr>
+          <a:xfrm>
+            <a:off x="6096000" y="1126097"/>
+            <a:ext cx="4949184" cy="1477328"/>
+          </a:xfrm>
+          <a:prstGeom prst="rect">
+            <a:avLst/>
+          </a:prstGeom>
+          <a:noFill/>
+        </p:spPr>
+        <p:txBody>
+          <a:bodyPr wrap="square" rtlCol="0">
+            <a:spAutoFit/>
+          </a:bodyPr>
+          <a:lstStyle/>
+          <a:p>
+            <a:r>
+              <a:rPr lang="pt-BR" dirty="0"/>
+              <a:t>São nas classes de mapeamento que vamos fazer o “De =&gt; Para” entre nossas classes e as tabelas do banco de dados. Aqui definimos o nome da tabela, os nomes das colunas e ainda qual tabela é a chave da nossa tabela.</a:t>
+            </a:r>
+          </a:p>
+        </p:txBody>
+      </p:sp>
+      <p:pic>
+        <p:nvPicPr>
+          <p:cNvPr id="5" name="Imagem 4">
+            <a:extLst>
+              <a:ext uri="{FF2B5EF4-FFF2-40B4-BE49-F238E27FC236}">
+                <a16:creationId xmlns:a16="http://schemas.microsoft.com/office/drawing/2014/main" id="{1B4D11FA-194B-4E04-B891-69F1944A688C}"/>
+              </a:ext>
+            </a:extLst>
+          </p:cNvPr>
+          <p:cNvPicPr>
+            <a:picLocks noChangeAspect="1"/>
+          </p:cNvPicPr>
+          <p:nvPr/>
+        </p:nvPicPr>
+        <p:blipFill>
+          <a:blip r:embed="rId3"/>
+          <a:stretch>
+            <a:fillRect/>
+          </a:stretch>
+        </p:blipFill>
+        <p:spPr>
+          <a:xfrm>
+            <a:off x="365765" y="3429000"/>
+            <a:ext cx="3596299" cy="2841076"/>
+          </a:xfrm>
+          <a:prstGeom prst="rect">
+            <a:avLst/>
+          </a:prstGeom>
+        </p:spPr>
+      </p:pic>
+      <p:sp>
+        <p:nvSpPr>
+          <p:cNvPr id="6" name="CaixaDeTexto 5">
+            <a:extLst>
+              <a:ext uri="{FF2B5EF4-FFF2-40B4-BE49-F238E27FC236}">
+                <a16:creationId xmlns:a16="http://schemas.microsoft.com/office/drawing/2014/main" id="{8CF5EF34-E4C8-4C7B-8CC1-A6421F379AF1}"/>
+              </a:ext>
+            </a:extLst>
+          </p:cNvPr>
+          <p:cNvSpPr txBox="1"/>
+          <p:nvPr/>
+        </p:nvSpPr>
+        <p:spPr>
+          <a:xfrm>
+            <a:off x="6096000" y="3833875"/>
+            <a:ext cx="4949184" cy="2031325"/>
+          </a:xfrm>
+          <a:prstGeom prst="rect">
+            <a:avLst/>
+          </a:prstGeom>
+          <a:noFill/>
+        </p:spPr>
+        <p:txBody>
+          <a:bodyPr wrap="square" rtlCol="0">
+            <a:spAutoFit/>
+          </a:bodyPr>
+          <a:lstStyle/>
+          <a:p>
+            <a:r>
+              <a:rPr lang="pt-BR" dirty="0"/>
+              <a:t>Além de definirmos os mapeamentos precisamos adicioná-los a um método que irá registrá-los na </a:t>
+            </a:r>
+            <a:r>
+              <a:rPr lang="pt-BR" dirty="0" err="1"/>
+              <a:t>stack</a:t>
+            </a:r>
+            <a:r>
+              <a:rPr lang="pt-BR" dirty="0"/>
+              <a:t> da nossa aplicação. O exemplo que vemos ao lado mostra as configurações que devemos fazer, posteriormente vamos utilizar este na camada da API (Passando pela camada de lógicas de negócio) para registrá-los nesta </a:t>
+            </a:r>
+            <a:r>
+              <a:rPr lang="pt-BR" dirty="0" err="1"/>
+              <a:t>stack</a:t>
+            </a:r>
+            <a:r>
+              <a:rPr lang="pt-BR" dirty="0"/>
+              <a:t>.</a:t>
+            </a:r>
+          </a:p>
+        </p:txBody>
+      </p:sp>
+    </p:spTree>
+    <p:extLst>
+      <p:ext uri="{BB962C8B-B14F-4D97-AF65-F5344CB8AC3E}">
+        <p14:creationId xmlns:p14="http://schemas.microsoft.com/office/powerpoint/2010/main" val="3066696656"/>
+      </p:ext>
+    </p:extLst>
+  </p:cSld>
+  <p:clrMapOvr>
+    <a:masterClrMapping/>
+  </p:clrMapOvr>
+</p:sld>
+</file>
+
 <file path=ppt/slides/slide2.xml><?xml version="1.0" encoding="utf-8"?>
 <p:sld xmlns:a="http://schemas.openxmlformats.org/drawingml/2006/main" xmlns:r="http://schemas.openxmlformats.org/officeDocument/2006/relationships" xmlns:p="http://schemas.openxmlformats.org/presentationml/2006/main">
   <p:cSld>
@@ -6168,7 +7416,7 @@
             <a:pPr algn="ctr"/>
             <a:r>
               <a:rPr lang="pt-BR" dirty="0"/>
-              <a:t>DL</a:t>
+              <a:t>DAL</a:t>
             </a:r>
           </a:p>
         </p:txBody>

</xml_diff>